<commit_message>
SQL queries for category improved for percent speed
</commit_message>
<xml_diff>
--- a/MagBuy Presentation.pptx
+++ b/MagBuy Presentation.pptx
@@ -2309,7 +2309,7 @@
           </a:ln>
           <a:extLst>
             <a:ext uri="{C572A759-6A51-4108-AA02-DFA0A04FC94B}">
-              <ma14:wrappingTextBoxFlag xmlns="" xmlns:ma14="http://schemas.microsoft.com/office/mac/drawingml/2011/main" val="1"/>
+              <ma14:wrappingTextBoxFlag xmlns:ma14="http://schemas.microsoft.com/office/mac/drawingml/2011/main" xmlns="" val="1"/>
             </a:ext>
           </a:extLst>
         </p:spPr>
@@ -2348,7 +2348,7 @@
           </a:ln>
           <a:extLst>
             <a:ext uri="{C572A759-6A51-4108-AA02-DFA0A04FC94B}">
-              <ma14:wrappingTextBoxFlag xmlns="" xmlns:ma14="http://schemas.microsoft.com/office/mac/drawingml/2011/main" val="1"/>
+              <ma14:wrappingTextBoxFlag xmlns:ma14="http://schemas.microsoft.com/office/mac/drawingml/2011/main" xmlns="" val="1"/>
             </a:ext>
           </a:extLst>
         </p:spPr>
@@ -3296,7 +3296,7 @@
           </a:ln>
           <a:extLst>
             <a:ext uri="{C572A759-6A51-4108-AA02-DFA0A04FC94B}">
-              <ma14:wrappingTextBoxFlag xmlns="" xmlns:ma14="http://schemas.microsoft.com/office/mac/drawingml/2011/main" val="1"/>
+              <ma14:wrappingTextBoxFlag xmlns:ma14="http://schemas.microsoft.com/office/mac/drawingml/2011/main" xmlns="" val="1"/>
             </a:ext>
           </a:extLst>
         </p:spPr>
@@ -3414,7 +3414,7 @@
             <a:effectLst/>
             <a:extLst>
               <a:ext uri="{C572A759-6A51-4108-AA02-DFA0A04FC94B}">
-                <ma14:wrappingTextBoxFlag xmlns="" xmlns:ma14="http://schemas.microsoft.com/office/mac/drawingml/2011/main" val="1"/>
+                <ma14:wrappingTextBoxFlag xmlns:ma14="http://schemas.microsoft.com/office/mac/drawingml/2011/main" xmlns="" val="1"/>
               </a:ext>
             </a:extLst>
           </p:spPr>
@@ -3713,7 +3713,15 @@
           <a:p>
             <a:r>
               <a:rPr lang="en-US" dirty="0"/>
-              <a:t>Hobbies: guitars, karaoke,  camping etc.</a:t>
+              <a:t>Hobbies: guitars, </a:t>
+            </a:r>
+            <a:r>
+              <a:rPr lang="en-US"/>
+              <a:t>karaoke, </a:t>
+            </a:r>
+            <a:r>
+              <a:rPr lang="en-US" dirty="0"/>
+              <a:t>camping etc.</a:t>
             </a:r>
             <a:endParaRPr dirty="0"/>
           </a:p>
@@ -3834,7 +3842,7 @@
             <a:effectLst/>
             <a:extLst>
               <a:ext uri="{C572A759-6A51-4108-AA02-DFA0A04FC94B}">
-                <ma14:wrappingTextBoxFlag xmlns="" xmlns:ma14="http://schemas.microsoft.com/office/mac/drawingml/2011/main" val="1"/>
+                <ma14:wrappingTextBoxFlag xmlns:ma14="http://schemas.microsoft.com/office/mac/drawingml/2011/main" xmlns="" val="1"/>
               </a:ext>
             </a:extLst>
           </p:spPr>
@@ -3879,7 +3887,7 @@
           </a:ln>
           <a:extLst>
             <a:ext uri="{C572A759-6A51-4108-AA02-DFA0A04FC94B}">
-              <ma14:wrappingTextBoxFlag xmlns="" xmlns:ma14="http://schemas.microsoft.com/office/mac/drawingml/2011/main" val="1"/>
+              <ma14:wrappingTextBoxFlag xmlns:ma14="http://schemas.microsoft.com/office/mac/drawingml/2011/main" xmlns="" val="1"/>
             </a:ext>
           </a:extLst>
         </p:spPr>
@@ -4233,7 +4241,7 @@
             <a:effectLst/>
             <a:extLst>
               <a:ext uri="{C572A759-6A51-4108-AA02-DFA0A04FC94B}">
-                <ma14:wrappingTextBoxFlag xmlns="" xmlns:ma14="http://schemas.microsoft.com/office/mac/drawingml/2011/main" val="1"/>
+                <ma14:wrappingTextBoxFlag xmlns:ma14="http://schemas.microsoft.com/office/mac/drawingml/2011/main" xmlns="" val="1"/>
               </a:ext>
             </a:extLst>
           </p:spPr>
@@ -4278,7 +4286,7 @@
           </a:ln>
           <a:extLst>
             <a:ext uri="{C572A759-6A51-4108-AA02-DFA0A04FC94B}">
-              <ma14:wrappingTextBoxFlag xmlns="" xmlns:ma14="http://schemas.microsoft.com/office/mac/drawingml/2011/main" val="1"/>
+              <ma14:wrappingTextBoxFlag xmlns:ma14="http://schemas.microsoft.com/office/mac/drawingml/2011/main" xmlns="" val="1"/>
             </a:ext>
           </a:extLst>
         </p:spPr>
@@ -4418,7 +4426,7 @@
           </a:ln>
           <a:extLst>
             <a:ext uri="{C572A759-6A51-4108-AA02-DFA0A04FC94B}">
-              <ma14:wrappingTextBoxFlag xmlns="" xmlns:ma14="http://schemas.microsoft.com/office/mac/drawingml/2011/main" val="1"/>
+              <ma14:wrappingTextBoxFlag xmlns:ma14="http://schemas.microsoft.com/office/mac/drawingml/2011/main" xmlns="" val="1"/>
             </a:ext>
           </a:extLst>
         </p:spPr>
@@ -4571,7 +4579,7 @@
             <a:effectLst/>
             <a:extLst>
               <a:ext uri="{C572A759-6A51-4108-AA02-DFA0A04FC94B}">
-                <ma14:wrappingTextBoxFlag xmlns="" xmlns:ma14="http://schemas.microsoft.com/office/mac/drawingml/2011/main" val="1"/>
+                <ma14:wrappingTextBoxFlag xmlns:ma14="http://schemas.microsoft.com/office/mac/drawingml/2011/main" xmlns="" val="1"/>
               </a:ext>
             </a:extLst>
           </p:spPr>
@@ -4752,7 +4760,7 @@
           </a:ln>
           <a:extLst>
             <a:ext uri="{C572A759-6A51-4108-AA02-DFA0A04FC94B}">
-              <ma14:wrappingTextBoxFlag xmlns="" xmlns:ma14="http://schemas.microsoft.com/office/mac/drawingml/2011/main" val="1"/>
+              <ma14:wrappingTextBoxFlag xmlns:ma14="http://schemas.microsoft.com/office/mac/drawingml/2011/main" xmlns="" val="1"/>
             </a:ext>
           </a:extLst>
         </p:spPr>
@@ -4905,7 +4913,7 @@
             <a:effectLst/>
             <a:extLst>
               <a:ext uri="{C572A759-6A51-4108-AA02-DFA0A04FC94B}">
-                <ma14:wrappingTextBoxFlag xmlns="" xmlns:ma14="http://schemas.microsoft.com/office/mac/drawingml/2011/main" val="1"/>
+                <ma14:wrappingTextBoxFlag xmlns:ma14="http://schemas.microsoft.com/office/mac/drawingml/2011/main" xmlns="" val="1"/>
               </a:ext>
             </a:extLst>
           </p:spPr>
@@ -5057,7 +5065,7 @@
           </a:ln>
           <a:extLst>
             <a:ext uri="{C572A759-6A51-4108-AA02-DFA0A04FC94B}">
-              <ma14:wrappingTextBoxFlag xmlns="" xmlns:ma14="http://schemas.microsoft.com/office/mac/drawingml/2011/main" val="1"/>
+              <ma14:wrappingTextBoxFlag xmlns:ma14="http://schemas.microsoft.com/office/mac/drawingml/2011/main" xmlns="" val="1"/>
             </a:ext>
           </a:extLst>
         </p:spPr>
@@ -5210,7 +5218,7 @@
             <a:effectLst/>
             <a:extLst>
               <a:ext uri="{C572A759-6A51-4108-AA02-DFA0A04FC94B}">
-                <ma14:wrappingTextBoxFlag xmlns="" xmlns:ma14="http://schemas.microsoft.com/office/mac/drawingml/2011/main" val="1"/>
+                <ma14:wrappingTextBoxFlag xmlns:ma14="http://schemas.microsoft.com/office/mac/drawingml/2011/main" xmlns="" val="1"/>
               </a:ext>
             </a:extLst>
           </p:spPr>
@@ -5364,7 +5372,7 @@
           </a:ln>
           <a:extLst>
             <a:ext uri="{C572A759-6A51-4108-AA02-DFA0A04FC94B}">
-              <ma14:wrappingTextBoxFlag xmlns="" xmlns:ma14="http://schemas.microsoft.com/office/mac/drawingml/2011/main" val="1"/>
+              <ma14:wrappingTextBoxFlag xmlns:ma14="http://schemas.microsoft.com/office/mac/drawingml/2011/main" xmlns="" val="1"/>
             </a:ext>
           </a:extLst>
         </p:spPr>
@@ -5508,7 +5516,7 @@
             <a:effectLst/>
             <a:extLst>
               <a:ext uri="{C572A759-6A51-4108-AA02-DFA0A04FC94B}">
-                <ma14:wrappingTextBoxFlag xmlns="" xmlns:ma14="http://schemas.microsoft.com/office/mac/drawingml/2011/main" val="1"/>
+                <ma14:wrappingTextBoxFlag xmlns:ma14="http://schemas.microsoft.com/office/mac/drawingml/2011/main" xmlns="" val="1"/>
               </a:ext>
             </a:extLst>
           </p:spPr>
@@ -5553,7 +5561,7 @@
           </a:ln>
           <a:extLst>
             <a:ext uri="{C572A759-6A51-4108-AA02-DFA0A04FC94B}">
-              <ma14:wrappingTextBoxFlag xmlns="" xmlns:ma14="http://schemas.microsoft.com/office/mac/drawingml/2011/main" val="1"/>
+              <ma14:wrappingTextBoxFlag xmlns:ma14="http://schemas.microsoft.com/office/mac/drawingml/2011/main" xmlns="" val="1"/>
             </a:ext>
           </a:extLst>
         </p:spPr>

</xml_diff>